<commit_message>
Add arch diagrams (rough pptx draft)
</commit_message>
<xml_diff>
--- a/images/architecture_diagram.pptx
+++ b/images/architecture_diagram.pptx
@@ -223,7 +223,7 @@
           <a:p>
             <a:fld id="{49A7721D-1176-A640-AC48-B82F78C92D56}" type="datetimeFigureOut">
               <a:rPr lang="en-US" smtClean="0"/>
-              <a:t>8/5/21</a:t>
+              <a:t>8/16/21</a:t>
             </a:fld>
             <a:endParaRPr lang="en-US" dirty="0"/>
           </a:p>
@@ -400,7 +400,7 @@
           <a:p>
             <a:fld id="{C884A089-FB25-6D46-9D21-F0F04A18BCA8}" type="datetimeFigureOut">
               <a:rPr lang="en-US" smtClean="0"/>
-              <a:t>8/4/21</a:t>
+              <a:t>8/16/21</a:t>
             </a:fld>
             <a:endParaRPr lang="en-US" dirty="0"/>
           </a:p>
@@ -3025,7 +3025,7 @@
                 <a:ea typeface="Amazon Ember" panose="020B0603020204020204" pitchFamily="34" charset="0"/>
                 <a:cs typeface="Arial" panose="020B0604020202020204" pitchFamily="34" charset="0"/>
               </a:rPr>
-              <a:t>Lambda function</a:t>
+              <a:t>Log Ingest</a:t>
             </a:r>
           </a:p>
         </p:txBody>
@@ -3802,6 +3802,227 @@
           </a:p>
         </p:txBody>
       </p:sp>
+      <p:sp>
+        <p:nvSpPr>
+          <p:cNvPr id="53" name="TextBox 9">
+            <a:extLst>
+              <a:ext uri="{FF2B5EF4-FFF2-40B4-BE49-F238E27FC236}">
+                <a16:creationId xmlns:a16="http://schemas.microsoft.com/office/drawing/2014/main" id="{9134D1C8-1557-CC4B-9145-AF581E19E47B}"/>
+              </a:ext>
+            </a:extLst>
+          </p:cNvPr>
+          <p:cNvSpPr txBox="1">
+            <a:spLocks noChangeArrowheads="1"/>
+          </p:cNvSpPr>
+          <p:nvPr/>
+        </p:nvSpPr>
+        <p:spPr bwMode="auto">
+          <a:xfrm>
+            <a:off x="6959968" y="1007843"/>
+            <a:ext cx="2243137" cy="276999"/>
+          </a:xfrm>
+          <a:prstGeom prst="rect">
+            <a:avLst/>
+          </a:prstGeom>
+          <a:noFill/>
+          <a:ln>
+            <a:noFill/>
+          </a:ln>
+          <a:extLst>
+            <a:ext uri="{909E8E84-426E-40DD-AFC4-6F175D3DCCD1}">
+              <a14:hiddenFill xmlns:a14="http://schemas.microsoft.com/office/drawing/2010/main">
+                <a:solidFill>
+                  <a:srgbClr val="FFFFFF"/>
+                </a:solidFill>
+              </a14:hiddenFill>
+            </a:ext>
+            <a:ext uri="{91240B29-F687-4F45-9708-019B960494DF}">
+              <a14:hiddenLine xmlns:a14="http://schemas.microsoft.com/office/drawing/2010/main" w="9525">
+                <a:solidFill>
+                  <a:srgbClr val="000000"/>
+                </a:solidFill>
+                <a:miter lim="800000"/>
+                <a:headEnd/>
+                <a:tailEnd/>
+              </a14:hiddenLine>
+            </a:ext>
+          </a:extLst>
+        </p:spPr>
+        <p:txBody>
+          <a:bodyPr>
+            <a:spAutoFit/>
+          </a:bodyPr>
+          <a:lstStyle>
+            <a:lvl1pPr>
+              <a:defRPr>
+                <a:solidFill>
+                  <a:schemeClr val="tx1"/>
+                </a:solidFill>
+                <a:latin typeface="Calibri" panose="020F0502020204030204" pitchFamily="34" charset="0"/>
+              </a:defRPr>
+            </a:lvl1pPr>
+            <a:lvl2pPr marL="742950" indent="-285750">
+              <a:defRPr>
+                <a:solidFill>
+                  <a:schemeClr val="tx1"/>
+                </a:solidFill>
+                <a:latin typeface="Calibri" panose="020F0502020204030204" pitchFamily="34" charset="0"/>
+              </a:defRPr>
+            </a:lvl2pPr>
+            <a:lvl3pPr marL="1143000" indent="-228600">
+              <a:defRPr>
+                <a:solidFill>
+                  <a:schemeClr val="tx1"/>
+                </a:solidFill>
+                <a:latin typeface="Calibri" panose="020F0502020204030204" pitchFamily="34" charset="0"/>
+              </a:defRPr>
+            </a:lvl3pPr>
+            <a:lvl4pPr marL="1600200" indent="-228600">
+              <a:defRPr>
+                <a:solidFill>
+                  <a:schemeClr val="tx1"/>
+                </a:solidFill>
+                <a:latin typeface="Calibri" panose="020F0502020204030204" pitchFamily="34" charset="0"/>
+              </a:defRPr>
+            </a:lvl4pPr>
+            <a:lvl5pPr marL="2057400" indent="-228600">
+              <a:defRPr>
+                <a:solidFill>
+                  <a:schemeClr val="tx1"/>
+                </a:solidFill>
+                <a:latin typeface="Calibri" panose="020F0502020204030204" pitchFamily="34" charset="0"/>
+              </a:defRPr>
+            </a:lvl5pPr>
+            <a:lvl6pPr marL="2514600" indent="-228600" eaLnBrk="0" fontAlgn="base" hangingPunct="0">
+              <a:spcBef>
+                <a:spcPct val="0"/>
+              </a:spcBef>
+              <a:spcAft>
+                <a:spcPct val="0"/>
+              </a:spcAft>
+              <a:defRPr>
+                <a:solidFill>
+                  <a:schemeClr val="tx1"/>
+                </a:solidFill>
+                <a:latin typeface="Calibri" panose="020F0502020204030204" pitchFamily="34" charset="0"/>
+              </a:defRPr>
+            </a:lvl6pPr>
+            <a:lvl7pPr marL="2971800" indent="-228600" eaLnBrk="0" fontAlgn="base" hangingPunct="0">
+              <a:spcBef>
+                <a:spcPct val="0"/>
+              </a:spcBef>
+              <a:spcAft>
+                <a:spcPct val="0"/>
+              </a:spcAft>
+              <a:defRPr>
+                <a:solidFill>
+                  <a:schemeClr val="tx1"/>
+                </a:solidFill>
+                <a:latin typeface="Calibri" panose="020F0502020204030204" pitchFamily="34" charset="0"/>
+              </a:defRPr>
+            </a:lvl7pPr>
+            <a:lvl8pPr marL="3429000" indent="-228600" eaLnBrk="0" fontAlgn="base" hangingPunct="0">
+              <a:spcBef>
+                <a:spcPct val="0"/>
+              </a:spcBef>
+              <a:spcAft>
+                <a:spcPct val="0"/>
+              </a:spcAft>
+              <a:defRPr>
+                <a:solidFill>
+                  <a:schemeClr val="tx1"/>
+                </a:solidFill>
+                <a:latin typeface="Calibri" panose="020F0502020204030204" pitchFamily="34" charset="0"/>
+              </a:defRPr>
+            </a:lvl8pPr>
+            <a:lvl9pPr marL="3886200" indent="-228600" eaLnBrk="0" fontAlgn="base" hangingPunct="0">
+              <a:spcBef>
+                <a:spcPct val="0"/>
+              </a:spcBef>
+              <a:spcAft>
+                <a:spcPct val="0"/>
+              </a:spcAft>
+              <a:defRPr>
+                <a:solidFill>
+                  <a:schemeClr val="tx1"/>
+                </a:solidFill>
+                <a:latin typeface="Calibri" panose="020F0502020204030204" pitchFamily="34" charset="0"/>
+              </a:defRPr>
+            </a:lvl9pPr>
+          </a:lstStyle>
+          <a:p>
+            <a:pPr algn="ctr" eaLnBrk="1" hangingPunct="1"/>
+            <a:r>
+              <a:rPr lang="en-US" altLang="en-US" sz="1200" dirty="0">
+                <a:latin typeface="Arial" panose="020B0604020202020204" pitchFamily="34" charset="0"/>
+                <a:ea typeface="Amazon Ember" panose="020B0603020204020204" pitchFamily="34" charset="0"/>
+                <a:cs typeface="Arial" panose="020B0604020202020204" pitchFamily="34" charset="0"/>
+              </a:rPr>
+              <a:t>Log Bucket</a:t>
+            </a:r>
+          </a:p>
+        </p:txBody>
+      </p:sp>
+      <p:pic>
+        <p:nvPicPr>
+          <p:cNvPr id="54" name="Graphic 66">
+            <a:extLst>
+              <a:ext uri="{FF2B5EF4-FFF2-40B4-BE49-F238E27FC236}">
+                <a16:creationId xmlns:a16="http://schemas.microsoft.com/office/drawing/2014/main" id="{E1A87E79-E8A9-1E4F-9CA7-ECF371F2630F}"/>
+              </a:ext>
+            </a:extLst>
+          </p:cNvPr>
+          <p:cNvPicPr>
+            <a:picLocks noChangeAspect="1" noChangeArrowheads="1"/>
+          </p:cNvPicPr>
+          <p:nvPr/>
+        </p:nvPicPr>
+        <p:blipFill>
+          <a:blip r:embed="rId24">
+            <a:extLst>
+              <a:ext uri="{28A0092B-C50C-407E-A947-70E740481C1C}">
+                <a14:useLocalDpi xmlns:a14="http://schemas.microsoft.com/office/drawing/2010/main" val="0"/>
+              </a:ext>
+            </a:extLst>
+          </a:blip>
+          <a:srcRect/>
+          <a:stretch>
+            <a:fillRect/>
+          </a:stretch>
+        </p:blipFill>
+        <p:spPr bwMode="auto">
+          <a:xfrm>
+            <a:off x="7852936" y="552772"/>
+            <a:ext cx="457200" cy="457200"/>
+          </a:xfrm>
+          <a:prstGeom prst="rect">
+            <a:avLst/>
+          </a:prstGeom>
+          <a:noFill/>
+          <a:ln>
+            <a:noFill/>
+          </a:ln>
+          <a:extLst>
+            <a:ext uri="{909E8E84-426E-40DD-AFC4-6F175D3DCCD1}">
+              <a14:hiddenFill xmlns:a14="http://schemas.microsoft.com/office/drawing/2010/main">
+                <a:solidFill>
+                  <a:srgbClr val="FFFFFF"/>
+                </a:solidFill>
+              </a14:hiddenFill>
+            </a:ext>
+            <a:ext uri="{91240B29-F687-4F45-9708-019B960494DF}">
+              <a14:hiddenLine xmlns:a14="http://schemas.microsoft.com/office/drawing/2010/main" w="9525">
+                <a:solidFill>
+                  <a:srgbClr val="000000"/>
+                </a:solidFill>
+                <a:miter lim="800000"/>
+                <a:headEnd/>
+                <a:tailEnd/>
+              </a14:hiddenLine>
+            </a:ext>
+          </a:extLst>
+        </p:spPr>
+      </p:pic>
     </p:spTree>
     <p:extLst>
       <p:ext uri="{BB962C8B-B14F-4D97-AF65-F5344CB8AC3E}">

</xml_diff>